<commit_message>
Sequence Diagrams for YB
</commit_message>
<xml_diff>
--- a/iPlanner Documentation/[V0.5]/Sequence Diagrams.pptx
+++ b/iPlanner Documentation/[V0.5]/Sequence Diagrams.pptx
@@ -17191,7 +17191,6 @@
                 <a:rPr lang="en-US" sz="1200" dirty="0" smtClean="0"/>
                 <a:t>User types in a command</a:t>
               </a:r>
-              <a:endParaRPr lang="en-US" sz="1200" dirty="0" smtClean="0"/>
             </a:p>
           </p:txBody>
         </p:sp>
@@ -17222,7 +17221,6 @@
                 <a:rPr lang="en-US" sz="1200" i="1" dirty="0" smtClean="0"/>
                 <a:t>parse(string)</a:t>
               </a:r>
-              <a:endParaRPr lang="en-US" sz="1200" i="1" dirty="0" smtClean="0"/>
             </a:p>
           </p:txBody>
         </p:sp>
@@ -17253,7 +17251,6 @@
                 <a:rPr lang="en-US" sz="1200" dirty="0" smtClean="0"/>
                 <a:t>list of instructions for Logic</a:t>
               </a:r>
-              <a:endParaRPr lang="en-US" sz="1200" dirty="0" smtClean="0"/>
             </a:p>
           </p:txBody>
         </p:sp>
@@ -17746,7 +17743,6 @@
                 <a:rPr lang="en-US" sz="1200" i="1" dirty="0" smtClean="0"/>
                 <a:t>(Item)</a:t>
               </a:r>
-              <a:endParaRPr lang="en-US" sz="1200" i="1" dirty="0" smtClean="0"/>
             </a:p>
           </p:txBody>
         </p:sp>
@@ -17859,7 +17855,6 @@
                 <a:rPr lang="en-US" sz="1200" dirty="0" smtClean="0"/>
                 <a:t>dd Item success/failure</a:t>
               </a:r>
-              <a:endParaRPr lang="en-US" sz="1200" dirty="0" smtClean="0"/>
             </a:p>
           </p:txBody>
         </p:sp>
@@ -17928,7 +17923,6 @@
                 <a:rPr lang="en-US" sz="1200" i="1" dirty="0" smtClean="0"/>
                 <a:t>(string)</a:t>
               </a:r>
-              <a:endParaRPr lang="en-US" sz="1200" i="1" dirty="0" smtClean="0"/>
             </a:p>
           </p:txBody>
         </p:sp>
@@ -18671,7 +18665,6 @@
                 <a:rPr lang="en-US" sz="1200" dirty="0" smtClean="0"/>
                 <a:t>User types in a command</a:t>
               </a:r>
-              <a:endParaRPr lang="en-US" sz="1200" dirty="0" smtClean="0"/>
             </a:p>
           </p:txBody>
         </p:sp>
@@ -18702,7 +18695,6 @@
                 <a:rPr lang="en-US" sz="1200" i="1" dirty="0" smtClean="0"/>
                 <a:t>parse(string)</a:t>
               </a:r>
-              <a:endParaRPr lang="en-US" sz="1200" i="1" dirty="0" smtClean="0"/>
             </a:p>
           </p:txBody>
         </p:sp>
@@ -18733,7 +18725,6 @@
                 <a:rPr lang="en-US" sz="1200" dirty="0" smtClean="0"/>
                 <a:t>list of instructions for Logic</a:t>
               </a:r>
-              <a:endParaRPr lang="en-US" sz="1200" dirty="0" smtClean="0"/>
             </a:p>
           </p:txBody>
         </p:sp>
@@ -18768,7 +18759,6 @@
                 <a:rPr lang="en-US" sz="1200" i="1" dirty="0" smtClean="0"/>
                 <a:t>()</a:t>
               </a:r>
-              <a:endParaRPr lang="en-US" sz="1200" i="1" dirty="0" smtClean="0"/>
             </a:p>
           </p:txBody>
         </p:sp>
@@ -18915,7 +18905,6 @@
                 <a:rPr lang="en-US" sz="1200" i="1" dirty="0" smtClean="0"/>
                 <a:t>(string)</a:t>
               </a:r>
-              <a:endParaRPr lang="en-US" sz="1200" i="1" dirty="0" smtClean="0"/>
             </a:p>
           </p:txBody>
         </p:sp>
@@ -19681,90 +19670,40 @@
             </a:fontRef>
           </p:style>
         </p:cxnSp>
-        <p:grpSp>
-          <p:nvGrpSpPr>
-            <p:cNvPr id="97" name="Group 96"/>
-            <p:cNvGrpSpPr/>
+        <p:cxnSp>
+          <p:nvCxnSpPr>
+            <p:cNvPr id="33" name="Straight Arrow Connector 32"/>
+            <p:cNvCxnSpPr/>
             <p:nvPr/>
-          </p:nvGrpSpPr>
-          <p:grpSpPr>
-            <a:xfrm>
-              <a:off x="3766363" y="3821249"/>
-              <a:ext cx="2316575" cy="364554"/>
-              <a:chOff x="3766363" y="3668353"/>
-              <a:chExt cx="2316575" cy="364554"/>
+          </p:nvCxnSpPr>
+          <p:spPr>
+            <a:xfrm flipH="1">
+              <a:off x="3766363" y="4185803"/>
+              <a:ext cx="2316575" cy="0"/>
             </a:xfrm>
-          </p:grpSpPr>
-          <p:cxnSp>
-            <p:nvCxnSpPr>
-              <p:cNvPr id="33" name="Straight Arrow Connector 32"/>
-              <p:cNvCxnSpPr/>
-              <p:nvPr/>
-            </p:nvCxnSpPr>
-            <p:spPr>
-              <a:xfrm flipH="1">
-                <a:off x="3766363" y="4032907"/>
-                <a:ext cx="2316575" cy="0"/>
-              </a:xfrm>
-              <a:prstGeom prst="straightConnector1">
-                <a:avLst/>
-              </a:prstGeom>
-              <a:ln>
-                <a:prstDash val="dash"/>
-                <a:tailEnd type="triangle"/>
-              </a:ln>
-            </p:spPr>
-            <p:style>
-              <a:lnRef idx="1">
-                <a:schemeClr val="dk1"/>
-              </a:lnRef>
-              <a:fillRef idx="0">
-                <a:schemeClr val="dk1"/>
-              </a:fillRef>
-              <a:effectRef idx="0">
-                <a:schemeClr val="dk1"/>
-              </a:effectRef>
-              <a:fontRef idx="minor">
-                <a:schemeClr val="tx1"/>
-              </a:fontRef>
-            </p:style>
-          </p:cxnSp>
-          <p:sp>
-            <p:nvSpPr>
-              <p:cNvPr id="69" name="TextBox 68"/>
-              <p:cNvSpPr txBox="1"/>
-              <p:nvPr/>
-            </p:nvSpPr>
-            <p:spPr>
-              <a:xfrm>
-                <a:off x="3792426" y="3668353"/>
-                <a:ext cx="2287400" cy="340734"/>
-              </a:xfrm>
-              <a:prstGeom prst="rect">
-                <a:avLst/>
-              </a:prstGeom>
-              <a:noFill/>
-            </p:spPr>
-            <p:txBody>
-              <a:bodyPr wrap="square" rtlCol="0">
-                <a:spAutoFit/>
-              </a:bodyPr>
-              <a:lstStyle/>
-              <a:p>
-                <a:pPr algn="ctr">
-                  <a:lnSpc>
-                    <a:spcPct val="150000"/>
-                  </a:lnSpc>
-                </a:pPr>
-                <a:r>
-                  <a:rPr lang="en-US" sz="1200" dirty="0" smtClean="0"/>
-                  <a:t>Update GUI</a:t>
-                </a:r>
-                <a:endParaRPr lang="en-US" sz="1200" dirty="0"/>
-              </a:p>
-            </p:txBody>
-          </p:sp>
-        </p:grpSp>
+            <a:prstGeom prst="straightConnector1">
+              <a:avLst/>
+            </a:prstGeom>
+            <a:ln>
+              <a:prstDash val="dash"/>
+              <a:tailEnd type="triangle"/>
+            </a:ln>
+          </p:spPr>
+          <p:style>
+            <a:lnRef idx="1">
+              <a:schemeClr val="dk1"/>
+            </a:lnRef>
+            <a:fillRef idx="0">
+              <a:schemeClr val="dk1"/>
+            </a:fillRef>
+            <a:effectRef idx="0">
+              <a:schemeClr val="dk1"/>
+            </a:effectRef>
+            <a:fontRef idx="minor">
+              <a:schemeClr val="tx1"/>
+            </a:fontRef>
+          </p:style>
+        </p:cxnSp>
         <p:sp>
           <p:nvSpPr>
             <p:cNvPr id="43" name="Rectangle 42"/>

</xml_diff>